<commit_message>
add mqu9 probs to generating_functions, add prob-simplify-tree.pptx, edit prob-intro-tree-model.pptx
</commit_message>
<xml_diff>
--- a/spring13/slides13/prob-intro-tree-model.pptx
+++ b/spring13/slides13/prob-intro-tree-model.pptx
@@ -5,10 +5,10 @@
     <p:sldMasterId id="2147483650" r:id="rId1"/>
   </p:sldMasterIdLst>
   <p:notesMasterIdLst>
-    <p:notesMasterId r:id="rId22"/>
+    <p:notesMasterId r:id="rId21"/>
   </p:notesMasterIdLst>
   <p:handoutMasterIdLst>
-    <p:handoutMasterId r:id="rId23"/>
+    <p:handoutMasterId r:id="rId22"/>
   </p:handoutMasterIdLst>
   <p:sldIdLst>
     <p:sldId id="256" r:id="rId2"/>
@@ -30,12 +30,11 @@
     <p:sldId id="272" r:id="rId18"/>
     <p:sldId id="273" r:id="rId19"/>
     <p:sldId id="275" r:id="rId20"/>
-    <p:sldId id="289" r:id="rId21"/>
   </p:sldIdLst>
   <p:sldSz cx="9144000" cy="6858000" type="screen4x3"/>
   <p:notesSz cx="9601200" cy="7315200"/>
   <p:custDataLst>
-    <p:tags r:id="rId25"/>
+    <p:tags r:id="rId24"/>
   </p:custDataLst>
   <p:defaultTextStyle>
     <a:defPPr>
@@ -2261,123 +2260,6 @@
 </p:notes>
 </file>
 
-<file path=ppt/notesSlides/notesSlide20.xml><?xml version="1.0" encoding="utf-8"?>
-<p:notes xmlns:a="http://schemas.openxmlformats.org/drawingml/2006/main" xmlns:r="http://schemas.openxmlformats.org/officeDocument/2006/relationships" xmlns:p="http://schemas.openxmlformats.org/presentationml/2006/main">
-  <p:cSld>
-    <p:spTree>
-      <p:nvGrpSpPr>
-        <p:cNvPr id="1" name=""/>
-        <p:cNvGrpSpPr/>
-        <p:nvPr/>
-      </p:nvGrpSpPr>
-      <p:grpSpPr>
-        <a:xfrm>
-          <a:off x="0" y="0"/>
-          <a:ext cx="0" cy="0"/>
-          <a:chOff x="0" y="0"/>
-          <a:chExt cx="0" cy="0"/>
-        </a:xfrm>
-      </p:grpSpPr>
-      <p:sp>
-        <p:nvSpPr>
-          <p:cNvPr id="52226" name="Slide Image Placeholder 1"/>
-          <p:cNvSpPr>
-            <a:spLocks noGrp="1" noRot="1" noChangeAspect="1" noTextEdit="1"/>
-          </p:cNvSpPr>
-          <p:nvPr>
-            <p:ph type="sldImg"/>
-          </p:nvPr>
-        </p:nvSpPr>
-        <p:spPr>
-          <a:ln/>
-        </p:spPr>
-      </p:sp>
-      <p:sp>
-        <p:nvSpPr>
-          <p:cNvPr id="52227" name="Notes Placeholder 2"/>
-          <p:cNvSpPr>
-            <a:spLocks noGrp="1"/>
-          </p:cNvSpPr>
-          <p:nvPr>
-            <p:ph type="body" idx="1"/>
-          </p:nvPr>
-        </p:nvSpPr>
-        <p:spPr>
-          <a:noFill/>
-          <a:ln/>
-        </p:spPr>
-        <p:txBody>
-          <a:bodyPr/>
-          <a:lstStyle/>
-          <a:p>
-            <a:pPr eaLnBrk="1" hangingPunct="1"/>
-            <a:endParaRPr lang="en-US" smtClean="0">
-              <a:latin typeface="Times New Roman" pitchFamily="-128" charset="0"/>
-            </a:endParaRPr>
-          </a:p>
-        </p:txBody>
-      </p:sp>
-      <p:sp>
-        <p:nvSpPr>
-          <p:cNvPr id="52228" name="Slide Number Placeholder 3"/>
-          <p:cNvSpPr>
-            <a:spLocks noGrp="1"/>
-          </p:cNvSpPr>
-          <p:nvPr>
-            <p:ph type="sldNum" sz="quarter" idx="5"/>
-          </p:nvPr>
-        </p:nvSpPr>
-        <p:spPr>
-          <a:noFill/>
-        </p:spPr>
-        <p:txBody>
-          <a:bodyPr/>
-          <a:lstStyle/>
-          <a:p>
-            <a:fld id="{4894881A-023E-4A32-AC3B-63CDE95BB983}" type="slidenum">
-              <a:rPr lang="en-US" smtClean="0">
-                <a:latin typeface="Times New Roman" pitchFamily="-128" charset="0"/>
-              </a:rPr>
-              <a:pPr/>
-              <a:t>20</a:t>
-            </a:fld>
-            <a:endParaRPr lang="en-US" smtClean="0">
-              <a:latin typeface="Times New Roman" pitchFamily="-128" charset="0"/>
-            </a:endParaRPr>
-          </a:p>
-        </p:txBody>
-      </p:sp>
-      <p:sp>
-        <p:nvSpPr>
-          <p:cNvPr id="52229" name="Footer Placeholder 4"/>
-          <p:cNvSpPr>
-            <a:spLocks noGrp="1"/>
-          </p:cNvSpPr>
-          <p:nvPr>
-            <p:ph type="ftr" sz="quarter" idx="4"/>
-          </p:nvPr>
-        </p:nvSpPr>
-        <p:spPr>
-          <a:noFill/>
-        </p:spPr>
-        <p:txBody>
-          <a:bodyPr/>
-          <a:lstStyle/>
-          <a:p>
-            <a:endParaRPr lang="en-US" smtClean="0">
-              <a:latin typeface="Times New Roman" pitchFamily="-128" charset="0"/>
-            </a:endParaRPr>
-          </a:p>
-        </p:txBody>
-      </p:sp>
-    </p:spTree>
-  </p:cSld>
-  <p:clrMapOvr>
-    <a:masterClrMapping/>
-  </p:clrMapOvr>
-</p:notes>
-</file>
-
 <file path=ppt/notesSlides/notesSlide3.xml><?xml version="1.0" encoding="utf-8"?>
 <p:notes xmlns:a="http://schemas.openxmlformats.org/drawingml/2006/main" xmlns:r="http://schemas.openxmlformats.org/officeDocument/2006/relationships" xmlns:p="http://schemas.openxmlformats.org/presentationml/2006/main">
   <p:cSld>
@@ -3933,116 +3815,6 @@
 
 <file path=ppt/slideLayouts/slideLayout15.xml><?xml version="1.0" encoding="utf-8"?>
 <p:sldLayout xmlns:a="http://schemas.openxmlformats.org/drawingml/2006/main" xmlns:r="http://schemas.openxmlformats.org/officeDocument/2006/relationships" xmlns:p="http://schemas.openxmlformats.org/presentationml/2006/main" userDrawn="1">
-  <p:cSld name="8_Title and Content">
-    <p:spTree>
-      <p:nvGrpSpPr>
-        <p:cNvPr id="1" name=""/>
-        <p:cNvGrpSpPr/>
-        <p:nvPr/>
-      </p:nvGrpSpPr>
-      <p:grpSpPr>
-        <a:xfrm>
-          <a:off x="0" y="0"/>
-          <a:ext cx="0" cy="0"/>
-          <a:chOff x="0" y="0"/>
-          <a:chExt cx="0" cy="0"/>
-        </a:xfrm>
-      </p:grpSpPr>
-      <p:sp>
-        <p:nvSpPr>
-          <p:cNvPr id="5" name="Title 4"/>
-          <p:cNvSpPr>
-            <a:spLocks noGrp="1"/>
-          </p:cNvSpPr>
-          <p:nvPr>
-            <p:ph type="title"/>
-          </p:nvPr>
-        </p:nvSpPr>
-        <p:spPr/>
-        <p:txBody>
-          <a:bodyPr/>
-          <a:lstStyle/>
-          <a:p>
-            <a:r>
-              <a:rPr lang="en-US" smtClean="0"/>
-              <a:t>Click to edit Master title style</a:t>
-            </a:r>
-            <a:endParaRPr lang="en-US"/>
-          </a:p>
-        </p:txBody>
-      </p:sp>
-      <p:sp>
-        <p:nvSpPr>
-          <p:cNvPr id="3" name="Rectangle 11"/>
-          <p:cNvSpPr>
-            <a:spLocks noGrp="1" noChangeArrowheads="1"/>
-          </p:cNvSpPr>
-          <p:nvPr>
-            <p:ph type="sldNum" sz="quarter" idx="4"/>
-          </p:nvPr>
-        </p:nvSpPr>
-        <p:spPr bwMode="auto">
-          <a:xfrm>
-            <a:off x="6400800" y="6613525"/>
-            <a:ext cx="2667000" cy="244475"/>
-          </a:xfrm>
-          <a:prstGeom prst="rect">
-            <a:avLst/>
-          </a:prstGeom>
-          <a:noFill/>
-          <a:ln w="9525">
-            <a:noFill/>
-            <a:miter lim="800000"/>
-            <a:headEnd/>
-            <a:tailEnd/>
-          </a:ln>
-          <a:effectLst/>
-        </p:spPr>
-        <p:txBody>
-          <a:bodyPr vert="horz" wrap="square" lIns="91440" tIns="45720" rIns="91440" bIns="45720" numCol="1" anchor="t" anchorCtr="0" compatLnSpc="1">
-            <a:prstTxWarp prst="textNoShape">
-              <a:avLst/>
-            </a:prstTxWarp>
-            <a:spAutoFit/>
-          </a:bodyPr>
-          <a:lstStyle>
-            <a:lvl1pPr algn="r">
-              <a:defRPr sz="1000"/>
-            </a:lvl1pPr>
-          </a:lstStyle>
-          <a:p>
-            <a:pPr>
-              <a:defRPr/>
-            </a:pPr>
-            <a:r>
-              <a:rPr lang="en-US" dirty="0" err="1" smtClean="0"/>
-              <a:t>lec</a:t>
-            </a:r>
-            <a:r>
-              <a:rPr lang="en-US" dirty="0" smtClean="0"/>
-              <a:t> 13W.</a:t>
-            </a:r>
-            <a:fld id="{17233D2A-0857-4415-88C1-423492E69A26}" type="slidenum">
-              <a:rPr lang="en-US" smtClean="0"/>
-              <a:pPr>
-                <a:defRPr/>
-              </a:pPr>
-              <a:t>‹#›</a:t>
-            </a:fld>
-            <a:endParaRPr lang="en-US" dirty="0"/>
-          </a:p>
-        </p:txBody>
-      </p:sp>
-    </p:spTree>
-  </p:cSld>
-  <p:clrMapOvr>
-    <a:masterClrMapping/>
-  </p:clrMapOvr>
-</p:sldLayout>
-</file>
-
-<file path=ppt/slideLayouts/slideLayout16.xml><?xml version="1.0" encoding="utf-8"?>
-<p:sldLayout xmlns:a="http://schemas.openxmlformats.org/drawingml/2006/main" xmlns:r="http://schemas.openxmlformats.org/officeDocument/2006/relationships" xmlns:p="http://schemas.openxmlformats.org/presentationml/2006/main" userDrawn="1">
   <p:cSld name="9_Title and Content">
     <p:spTree>
       <p:nvGrpSpPr>
@@ -4089,7 +3861,7 @@
 </p:sldLayout>
 </file>
 
-<file path=ppt/slideLayouts/slideLayout17.xml><?xml version="1.0" encoding="utf-8"?>
+<file path=ppt/slideLayouts/slideLayout16.xml><?xml version="1.0" encoding="utf-8"?>
 <p:sldLayout xmlns:a="http://schemas.openxmlformats.org/drawingml/2006/main" xmlns:r="http://schemas.openxmlformats.org/officeDocument/2006/relationships" xmlns:p="http://schemas.openxmlformats.org/presentationml/2006/main" userDrawn="1">
   <p:cSld name="13_Title and Content">
     <p:spTree>
@@ -5583,7 +5355,7 @@
           <p:nvPr userDrawn="1"/>
         </p:nvPicPr>
         <p:blipFill>
-          <a:blip r:embed="rId19"/>
+          <a:blip r:embed="rId18"/>
           <a:srcRect/>
           <a:stretch>
             <a:fillRect/>
@@ -5683,7 +5455,7 @@
           <p:nvPr userDrawn="1"/>
         </p:nvPicPr>
         <p:blipFill>
-          <a:blip r:embed="rId20"/>
+          <a:blip r:embed="rId19"/>
           <a:stretch>
             <a:fillRect/>
           </a:stretch>
@@ -5716,9 +5488,8 @@
     <p:sldLayoutId id="2147483669" r:id="rId12"/>
     <p:sldLayoutId id="2147483670" r:id="rId13"/>
     <p:sldLayoutId id="2147483671" r:id="rId14"/>
-    <p:sldLayoutId id="2147483672" r:id="rId15"/>
-    <p:sldLayoutId id="2147483673" r:id="rId16"/>
-    <p:sldLayoutId id="2147483677" r:id="rId17"/>
+    <p:sldLayoutId id="2147483673" r:id="rId15"/>
+    <p:sldLayoutId id="2147483677" r:id="rId16"/>
   </p:sldLayoutIdLst>
   <p:hf hdr="0" ftr="0" dt="0"/>
   <p:txStyles>
@@ -12697,13 +12468,7 @@
               <a:rPr lang="en-US" sz="4500" dirty="0" smtClean="0">
                 <a:latin typeface="Comic Sans MS" pitchFamily="-128" charset="0"/>
               </a:rPr>
-              <a:t> the prize (by symmetry), </a:t>
-            </a:r>
-            <a:r>
-              <a:rPr lang="en-US" sz="4500" dirty="0" smtClean="0">
-                <a:latin typeface="Comic Sans MS" pitchFamily="-128" charset="0"/>
-              </a:rPr>
-              <a:t>so</a:t>
+              <a:t> the prize (by symmetry), so</a:t>
             </a:r>
           </a:p>
           <a:p>
@@ -12724,19 +12489,7 @@
               <a:rPr lang="en-US" sz="4500" dirty="0" smtClean="0">
                 <a:latin typeface="Comic Sans MS" pitchFamily="-128" charset="0"/>
               </a:rPr>
-              <a:t>both </a:t>
-            </a:r>
-            <a:r>
-              <a:rPr lang="en-US" sz="4500" dirty="0" smtClean="0">
-                <a:latin typeface="Comic Sans MS" pitchFamily="-128" charset="0"/>
-              </a:rPr>
-              <a:t>strategies win </a:t>
-            </a:r>
-            <a:r>
-              <a:rPr lang="en-US" sz="4500" dirty="0" smtClean="0">
-                <a:latin typeface="Comic Sans MS" pitchFamily="-128" charset="0"/>
-              </a:rPr>
-              <a:t>with</a:t>
+              <a:t>both strategies win with</a:t>
             </a:r>
           </a:p>
           <a:p>
@@ -12757,13 +12510,7 @@
               <a:rPr lang="en-US" sz="4500" dirty="0" smtClean="0">
                 <a:latin typeface="Comic Sans MS" pitchFamily="-128" charset="0"/>
               </a:rPr>
-              <a:t>probability</a:t>
-            </a:r>
-            <a:r>
-              <a:rPr lang="en-US" sz="4500" dirty="0" smtClean="0">
-                <a:latin typeface="Comic Sans MS" pitchFamily="-128" charset="0"/>
-              </a:rPr>
-              <a:t>: </a:t>
+              <a:t>probability: </a:t>
             </a:r>
             <a:r>
               <a:rPr lang="en-US" sz="4500" dirty="0" smtClean="0">
@@ -18732,13 +18479,13 @@
   <p:clrMapOvr>
     <a:masterClrMapping/>
   </p:clrMapOvr>
-  <mc:AlternateContent xmlns:mc="http://schemas.openxmlformats.org/markup-compatibility/2006">
-    <mc:Choice xmlns:p14="http://schemas.microsoft.com/office/powerpoint/2010/main" Requires="p14">
+  <mc:AlternateContent xmlns:mc="http://schemas.openxmlformats.org/markup-compatibility/2006" xmlns:p14="http://schemas.microsoft.com/office/powerpoint/2010/main">
+    <mc:Choice Requires="p14">
       <p:transition spd="med" p14:dur="700" advClick="0">
         <p:fade thruBlk="1"/>
       </p:transition>
     </mc:Choice>
-    <mc:Fallback>
+    <mc:Fallback xmlns="">
       <p:transition xmlns:p14="http://schemas.microsoft.com/office/powerpoint/2010/main" spd="med" advClick="0">
         <p:fade thruBlk="1"/>
       </p:transition>
@@ -20919,7 +20666,7 @@
   <p:clrMapOvr>
     <a:masterClrMapping/>
   </p:clrMapOvr>
-  <p:transition xmlns:p14="http://schemas.microsoft.com/office/powerpoint/2010/main" spd="slow">
+  <p:transition xmlns:p14="http://schemas.microsoft.com/office/powerpoint/2010/main" spd="slow" advClick="0">
     <p:fade thruBlk="1"/>
   </p:transition>
   <p:timing>
@@ -21556,1334 +21303,6 @@
 </p:sld>
 </file>
 
-<file path=ppt/slides/slide20.xml><?xml version="1.0" encoding="utf-8"?>
-<p:sld xmlns:a="http://schemas.openxmlformats.org/drawingml/2006/main" xmlns:r="http://schemas.openxmlformats.org/officeDocument/2006/relationships" xmlns:p="http://schemas.openxmlformats.org/presentationml/2006/main">
-  <p:cSld>
-    <p:spTree>
-      <p:nvGrpSpPr>
-        <p:cNvPr id="1" name=""/>
-        <p:cNvGrpSpPr/>
-        <p:nvPr/>
-      </p:nvGrpSpPr>
-      <p:grpSpPr>
-        <a:xfrm>
-          <a:off x="0" y="0"/>
-          <a:ext cx="0" cy="0"/>
-          <a:chOff x="0" y="0"/>
-          <a:chExt cx="0" cy="0"/>
-        </a:xfrm>
-      </p:grpSpPr>
-      <p:sp>
-        <p:nvSpPr>
-          <p:cNvPr id="44065" name="Text Box 33"/>
-          <p:cNvSpPr txBox="1">
-            <a:spLocks noChangeArrowheads="1"/>
-          </p:cNvSpPr>
-          <p:nvPr/>
-        </p:nvSpPr>
-        <p:spPr bwMode="auto">
-          <a:xfrm>
-            <a:off x="533400" y="1371600"/>
-            <a:ext cx="8077200" cy="1569660"/>
-          </a:xfrm>
-          <a:prstGeom prst="rect">
-            <a:avLst/>
-          </a:prstGeom>
-          <a:noFill/>
-          <a:ln w="9525">
-            <a:noFill/>
-            <a:miter lim="800000"/>
-            <a:headEnd/>
-            <a:tailEnd/>
-          </a:ln>
-        </p:spPr>
-        <p:txBody>
-          <a:bodyPr wrap="square">
-            <a:spAutoFit/>
-          </a:bodyPr>
-          <a:lstStyle/>
-          <a:p>
-            <a:r>
-              <a:rPr lang="en-US" sz="4800" dirty="0" smtClean="0">
-                <a:solidFill>
-                  <a:srgbClr val="7030A0"/>
-                </a:solidFill>
-                <a:latin typeface="Comic Sans MS" pitchFamily="-128" charset="0"/>
-              </a:rPr>
-              <a:t>SWITCH</a:t>
-            </a:r>
-            <a:r>
-              <a:rPr lang="en-US" sz="4800" dirty="0" smtClean="0">
-                <a:latin typeface="Comic Sans MS" pitchFamily="-128" charset="0"/>
-              </a:rPr>
-              <a:t> </a:t>
-            </a:r>
-            <a:r>
-              <a:rPr lang="en-US" sz="4800" dirty="0">
-                <a:latin typeface="Comic Sans MS" pitchFamily="-128" charset="0"/>
-              </a:rPr>
-              <a:t>strategy wins </a:t>
-            </a:r>
-            <a:r>
-              <a:rPr lang="en-US" sz="4800" u="sng" dirty="0" err="1">
-                <a:latin typeface="Comic Sans MS" pitchFamily="-128" charset="0"/>
-              </a:rPr>
-              <a:t>iff</a:t>
-            </a:r>
-            <a:endParaRPr lang="en-US" sz="4800" dirty="0">
-              <a:latin typeface="Comic Sans MS" pitchFamily="-128" charset="0"/>
-            </a:endParaRPr>
-          </a:p>
-          <a:p>
-            <a:r>
-              <a:rPr lang="en-US" sz="4800" dirty="0" smtClean="0">
-                <a:latin typeface="Comic Sans MS" pitchFamily="-128" charset="0"/>
-              </a:rPr>
-              <a:t>prize door </a:t>
-            </a:r>
-            <a:r>
-              <a:rPr lang="en-US" sz="4800" dirty="0" smtClean="0">
-                <a:solidFill>
-                  <a:srgbClr val="CC00CC"/>
-                </a:solidFill>
-                <a:latin typeface="Comic Sans MS" pitchFamily="-128" charset="0"/>
-              </a:rPr>
-              <a:t>not</a:t>
-            </a:r>
-            <a:r>
-              <a:rPr lang="en-US" sz="4800" dirty="0" smtClean="0">
-                <a:latin typeface="Comic Sans MS" pitchFamily="-128" charset="0"/>
-              </a:rPr>
-              <a:t> picked:</a:t>
-            </a:r>
-            <a:endParaRPr lang="en-US" sz="4800" dirty="0">
-              <a:latin typeface="Comic Sans MS" pitchFamily="-128" charset="0"/>
-            </a:endParaRPr>
-          </a:p>
-        </p:txBody>
-      </p:sp>
-      <p:sp>
-        <p:nvSpPr>
-          <p:cNvPr id="20483" name="Text Box 34"/>
-          <p:cNvSpPr txBox="1">
-            <a:spLocks noChangeArrowheads="1"/>
-          </p:cNvSpPr>
-          <p:nvPr/>
-        </p:nvSpPr>
-        <p:spPr bwMode="auto">
-          <a:xfrm>
-            <a:off x="1447800" y="457200"/>
-            <a:ext cx="5541902" cy="723275"/>
-          </a:xfrm>
-          <a:prstGeom prst="rect">
-            <a:avLst/>
-          </a:prstGeom>
-          <a:noFill/>
-          <a:ln w="9525">
-            <a:noFill/>
-            <a:miter lim="800000"/>
-            <a:headEnd/>
-            <a:tailEnd/>
-          </a:ln>
-        </p:spPr>
-        <p:txBody>
-          <a:bodyPr wrap="none">
-            <a:spAutoFit/>
-          </a:bodyPr>
-          <a:lstStyle/>
-          <a:p>
-            <a:r>
-              <a:rPr lang="en-US" sz="4100" b="1" dirty="0" smtClean="0">
-                <a:latin typeface="Comic Sans MS" pitchFamily="-128" charset="0"/>
-              </a:rPr>
-              <a:t>really simple analysis</a:t>
-            </a:r>
-            <a:endParaRPr lang="en-US" sz="4100" b="1" dirty="0"/>
-          </a:p>
-        </p:txBody>
-      </p:sp>
-      <p:grpSp>
-        <p:nvGrpSpPr>
-          <p:cNvPr id="2" name="Group 23"/>
-          <p:cNvGrpSpPr/>
-          <p:nvPr/>
-        </p:nvGrpSpPr>
-        <p:grpSpPr>
-          <a:xfrm>
-            <a:off x="685800" y="3200400"/>
-            <a:ext cx="4009431" cy="3146286"/>
-            <a:chOff x="685800" y="3200400"/>
-            <a:chExt cx="4009431" cy="3146286"/>
-          </a:xfrm>
-        </p:grpSpPr>
-        <p:sp>
-          <p:nvSpPr>
-            <p:cNvPr id="4" name="Oval 3"/>
-            <p:cNvSpPr/>
-            <p:nvPr/>
-          </p:nvSpPr>
-          <p:spPr>
-            <a:xfrm>
-              <a:off x="1447800" y="4267200"/>
-              <a:ext cx="152400" cy="152400"/>
-            </a:xfrm>
-            <a:prstGeom prst="ellipse">
-              <a:avLst/>
-            </a:prstGeom>
-            <a:solidFill>
-              <a:schemeClr val="tx1"/>
-            </a:solidFill>
-            <a:ln w="34925">
-              <a:noFill/>
-            </a:ln>
-          </p:spPr>
-          <p:style>
-            <a:lnRef idx="2">
-              <a:schemeClr val="accent1">
-                <a:shade val="50000"/>
-              </a:schemeClr>
-            </a:lnRef>
-            <a:fillRef idx="1">
-              <a:schemeClr val="accent1"/>
-            </a:fillRef>
-            <a:effectRef idx="0">
-              <a:schemeClr val="accent1"/>
-            </a:effectRef>
-            <a:fontRef idx="minor">
-              <a:schemeClr val="lt1"/>
-            </a:fontRef>
-          </p:style>
-          <p:txBody>
-            <a:bodyPr rtlCol="0" anchor="ctr"/>
-            <a:lstStyle/>
-            <a:p>
-              <a:pPr algn="ctr"/>
-              <a:endParaRPr lang="en-US"/>
-            </a:p>
-          </p:txBody>
-        </p:sp>
-        <p:sp>
-          <p:nvSpPr>
-            <p:cNvPr id="5" name="Oval 4"/>
-            <p:cNvSpPr/>
-            <p:nvPr/>
-          </p:nvSpPr>
-          <p:spPr>
-            <a:xfrm>
-              <a:off x="3200400" y="5410200"/>
-              <a:ext cx="152400" cy="152400"/>
-            </a:xfrm>
-            <a:prstGeom prst="ellipse">
-              <a:avLst/>
-            </a:prstGeom>
-            <a:solidFill>
-              <a:schemeClr val="tx1"/>
-            </a:solidFill>
-            <a:ln w="34925">
-              <a:noFill/>
-            </a:ln>
-          </p:spPr>
-          <p:style>
-            <a:lnRef idx="2">
-              <a:schemeClr val="accent1">
-                <a:shade val="50000"/>
-              </a:schemeClr>
-            </a:lnRef>
-            <a:fillRef idx="1">
-              <a:schemeClr val="accent1"/>
-            </a:fillRef>
-            <a:effectRef idx="0">
-              <a:schemeClr val="accent1"/>
-            </a:effectRef>
-            <a:fontRef idx="minor">
-              <a:schemeClr val="lt1"/>
-            </a:fontRef>
-          </p:style>
-          <p:txBody>
-            <a:bodyPr rtlCol="0" anchor="ctr"/>
-            <a:lstStyle/>
-            <a:p>
-              <a:pPr algn="ctr"/>
-              <a:endParaRPr lang="en-US"/>
-            </a:p>
-          </p:txBody>
-        </p:sp>
-        <p:sp>
-          <p:nvSpPr>
-            <p:cNvPr id="6" name="Oval 5"/>
-            <p:cNvSpPr/>
-            <p:nvPr/>
-          </p:nvSpPr>
-          <p:spPr>
-            <a:xfrm>
-              <a:off x="3276600" y="3200400"/>
-              <a:ext cx="152400" cy="152400"/>
-            </a:xfrm>
-            <a:prstGeom prst="ellipse">
-              <a:avLst/>
-            </a:prstGeom>
-            <a:solidFill>
-              <a:schemeClr val="tx1"/>
-            </a:solidFill>
-            <a:ln w="34925">
-              <a:noFill/>
-            </a:ln>
-          </p:spPr>
-          <p:style>
-            <a:lnRef idx="2">
-              <a:schemeClr val="accent1">
-                <a:shade val="50000"/>
-              </a:schemeClr>
-            </a:lnRef>
-            <a:fillRef idx="1">
-              <a:schemeClr val="accent1"/>
-            </a:fillRef>
-            <a:effectRef idx="0">
-              <a:schemeClr val="accent1"/>
-            </a:effectRef>
-            <a:fontRef idx="minor">
-              <a:schemeClr val="lt1"/>
-            </a:fontRef>
-          </p:style>
-          <p:txBody>
-            <a:bodyPr rtlCol="0" anchor="ctr"/>
-            <a:lstStyle/>
-            <a:p>
-              <a:pPr algn="ctr"/>
-              <a:endParaRPr lang="en-US"/>
-            </a:p>
-          </p:txBody>
-        </p:sp>
-        <p:grpSp>
-          <p:nvGrpSpPr>
-            <p:cNvPr id="3" name="Group 17"/>
-            <p:cNvGrpSpPr/>
-            <p:nvPr/>
-          </p:nvGrpSpPr>
-          <p:grpSpPr>
-            <a:xfrm>
-              <a:off x="685800" y="3330482"/>
-              <a:ext cx="4009431" cy="3016204"/>
-              <a:chOff x="2184167" y="3330482"/>
-              <a:chExt cx="4009431" cy="3016204"/>
-            </a:xfrm>
-          </p:grpSpPr>
-          <p:cxnSp>
-            <p:nvCxnSpPr>
-              <p:cNvPr id="8" name="Straight Connector 7"/>
-              <p:cNvCxnSpPr>
-                <a:stCxn id="4" idx="6"/>
-                <a:endCxn id="6" idx="3"/>
-              </p:cNvCxnSpPr>
-              <p:nvPr/>
-            </p:nvCxnSpPr>
-            <p:spPr>
-              <a:xfrm flipV="1">
-                <a:off x="3098567" y="3330482"/>
-                <a:ext cx="1698718" cy="1012918"/>
-              </a:xfrm>
-              <a:prstGeom prst="line">
-                <a:avLst/>
-              </a:prstGeom>
-              <a:ln w="38100">
-                <a:solidFill>
-                  <a:schemeClr val="tx1"/>
-                </a:solidFill>
-              </a:ln>
-            </p:spPr>
-            <p:style>
-              <a:lnRef idx="1">
-                <a:schemeClr val="accent1"/>
-              </a:lnRef>
-              <a:fillRef idx="0">
-                <a:schemeClr val="accent1"/>
-              </a:fillRef>
-              <a:effectRef idx="0">
-                <a:schemeClr val="accent1"/>
-              </a:effectRef>
-              <a:fontRef idx="minor">
-                <a:schemeClr val="tx1"/>
-              </a:fontRef>
-            </p:style>
-          </p:cxnSp>
-          <p:cxnSp>
-            <p:nvCxnSpPr>
-              <p:cNvPr id="9" name="Straight Connector 8"/>
-              <p:cNvCxnSpPr>
-                <a:stCxn id="4" idx="5"/>
-                <a:endCxn id="5" idx="1"/>
-              </p:cNvCxnSpPr>
-              <p:nvPr/>
-            </p:nvCxnSpPr>
-            <p:spPr>
-              <a:xfrm rot="16200000" flipH="1">
-                <a:off x="3381049" y="4092482"/>
-                <a:ext cx="1035236" cy="1644836"/>
-              </a:xfrm>
-              <a:prstGeom prst="line">
-                <a:avLst/>
-              </a:prstGeom>
-              <a:ln w="38100">
-                <a:solidFill>
-                  <a:schemeClr val="tx1"/>
-                </a:solidFill>
-              </a:ln>
-            </p:spPr>
-            <p:style>
-              <a:lnRef idx="1">
-                <a:schemeClr val="accent1"/>
-              </a:lnRef>
-              <a:fillRef idx="0">
-                <a:schemeClr val="accent1"/>
-              </a:fillRef>
-              <a:effectRef idx="0">
-                <a:schemeClr val="accent1"/>
-              </a:effectRef>
-              <a:fontRef idx="minor">
-                <a:schemeClr val="tx1"/>
-              </a:fontRef>
-            </p:style>
-          </p:cxnSp>
-          <p:sp>
-            <p:nvSpPr>
-              <p:cNvPr id="12" name="TextBox 11"/>
-              <p:cNvSpPr txBox="1"/>
-              <p:nvPr/>
-            </p:nvSpPr>
-            <p:spPr>
-              <a:xfrm>
-                <a:off x="2184167" y="5638800"/>
-                <a:ext cx="4009431" cy="707886"/>
-              </a:xfrm>
-              <a:prstGeom prst="rect">
-                <a:avLst/>
-              </a:prstGeom>
-              <a:noFill/>
-            </p:spPr>
-            <p:txBody>
-              <a:bodyPr wrap="none" rtlCol="0">
-                <a:spAutoFit/>
-              </a:bodyPr>
-              <a:lstStyle/>
-              <a:p>
-                <a:r>
-                  <a:rPr lang="en-US" sz="4000" dirty="0" smtClean="0">
-                    <a:latin typeface="Comic Sans MS" pitchFamily="66" charset="0"/>
-                  </a:rPr>
-                  <a:t>picks prize door</a:t>
-                </a:r>
-              </a:p>
-            </p:txBody>
-          </p:sp>
-          <p:sp>
-            <p:nvSpPr>
-              <p:cNvPr id="13" name="TextBox 12"/>
-              <p:cNvSpPr txBox="1"/>
-              <p:nvPr/>
-            </p:nvSpPr>
-            <p:spPr>
-              <a:xfrm>
-                <a:off x="4196291" y="3505200"/>
-                <a:ext cx="1061509" cy="769441"/>
-              </a:xfrm>
-              <a:prstGeom prst="rect">
-                <a:avLst/>
-              </a:prstGeom>
-              <a:noFill/>
-            </p:spPr>
-            <p:txBody>
-              <a:bodyPr wrap="none" rtlCol="0">
-                <a:spAutoFit/>
-              </a:bodyPr>
-              <a:lstStyle/>
-              <a:p>
-                <a:r>
-                  <a:rPr lang="en-US" dirty="0" smtClean="0">
-                    <a:latin typeface="Comic Sans MS" pitchFamily="66" charset="0"/>
-                  </a:rPr>
-                  <a:t>yes</a:t>
-                </a:r>
-              </a:p>
-            </p:txBody>
-          </p:sp>
-          <p:sp>
-            <p:nvSpPr>
-              <p:cNvPr id="14" name="TextBox 13"/>
-              <p:cNvSpPr txBox="1"/>
-              <p:nvPr/>
-            </p:nvSpPr>
-            <p:spPr>
-              <a:xfrm>
-                <a:off x="4183912" y="4495800"/>
-                <a:ext cx="776175" cy="769441"/>
-              </a:xfrm>
-              <a:prstGeom prst="rect">
-                <a:avLst/>
-              </a:prstGeom>
-              <a:noFill/>
-            </p:spPr>
-            <p:txBody>
-              <a:bodyPr wrap="none" rtlCol="0">
-                <a:spAutoFit/>
-              </a:bodyPr>
-              <a:lstStyle/>
-              <a:p>
-                <a:r>
-                  <a:rPr lang="en-US" dirty="0" smtClean="0">
-                    <a:solidFill>
-                      <a:srgbClr val="CC00CC"/>
-                    </a:solidFill>
-                    <a:latin typeface="Comic Sans MS" pitchFamily="66" charset="0"/>
-                  </a:rPr>
-                  <a:t>no</a:t>
-                </a:r>
-              </a:p>
-            </p:txBody>
-          </p:sp>
-        </p:grpSp>
-      </p:grpSp>
-      <p:graphicFrame>
-        <p:nvGraphicFramePr>
-          <p:cNvPr id="16" name="Object 15"/>
-          <p:cNvGraphicFramePr>
-            <a:graphicFrameLocks noChangeAspect="1"/>
-          </p:cNvGraphicFramePr>
-          <p:nvPr/>
-        </p:nvGraphicFramePr>
-        <p:xfrm>
-          <a:off x="1854433" y="2971800"/>
-          <a:ext cx="292100" cy="990600"/>
-        </p:xfrm>
-        <a:graphic>
-          <a:graphicData uri="http://schemas.openxmlformats.org/presentationml/2006/ole">
-            <mc:AlternateContent xmlns:mc="http://schemas.openxmlformats.org/markup-compatibility/2006">
-              <mc:Choice xmlns:v="urn:schemas-microsoft-com:vml" Requires="v">
-                <p:oleObj spid="_x0000_s308285" name="Equation" r:id="rId4" imgW="291960" imgH="939600" progId="Equation.DSMT4">
-                  <p:embed/>
-                </p:oleObj>
-              </mc:Choice>
-              <mc:Fallback>
-                <p:oleObj name="Equation" r:id="rId4" imgW="291960" imgH="939600" progId="Equation.DSMT4">
-                  <p:embed/>
-                  <p:pic>
-                    <p:nvPicPr>
-                      <p:cNvPr id="0" name="Picture 2"/>
-                      <p:cNvPicPr>
-                        <a:picLocks noChangeAspect="1" noChangeArrowheads="1"/>
-                      </p:cNvPicPr>
-                      <p:nvPr/>
-                    </p:nvPicPr>
-                    <p:blipFill>
-                      <a:blip r:embed="rId5">
-                        <a:extLst>
-                          <a:ext uri="{28A0092B-C50C-407E-A947-70E740481C1C}">
-                            <a14:useLocalDpi xmlns:a14="http://schemas.microsoft.com/office/drawing/2010/main" val="0"/>
-                          </a:ext>
-                        </a:extLst>
-                      </a:blip>
-                      <a:srcRect/>
-                      <a:stretch>
-                        <a:fillRect/>
-                      </a:stretch>
-                    </p:blipFill>
-                    <p:spPr bwMode="auto">
-                      <a:xfrm>
-                        <a:off x="1854433" y="2971800"/>
-                        <a:ext cx="292100" cy="990600"/>
-                      </a:xfrm>
-                      <a:prstGeom prst="rect">
-                        <a:avLst/>
-                      </a:prstGeom>
-                      <a:noFill/>
-                      <a:extLst>
-                        <a:ext uri="{909E8E84-426E-40dd-AFC4-6F175D3DCCD1}">
-                          <a14:hiddenFill xmlns:a14="http://schemas.microsoft.com/office/drawing/2010/main">
-                            <a:solidFill>
-                              <a:srgbClr val="FFFFFF"/>
-                            </a:solidFill>
-                          </a14:hiddenFill>
-                        </a:ext>
-                      </a:extLst>
-                    </p:spPr>
-                  </p:pic>
-                </p:oleObj>
-              </mc:Fallback>
-            </mc:AlternateContent>
-          </a:graphicData>
-        </a:graphic>
-      </p:graphicFrame>
-      <p:graphicFrame>
-        <p:nvGraphicFramePr>
-          <p:cNvPr id="35842" name="Object 2"/>
-          <p:cNvGraphicFramePr>
-            <a:graphicFrameLocks noChangeAspect="1"/>
-          </p:cNvGraphicFramePr>
-          <p:nvPr/>
-        </p:nvGraphicFramePr>
-        <p:xfrm>
-          <a:off x="1854433" y="4724400"/>
-          <a:ext cx="292100" cy="990600"/>
-        </p:xfrm>
-        <a:graphic>
-          <a:graphicData uri="http://schemas.openxmlformats.org/presentationml/2006/ole">
-            <mc:AlternateContent xmlns:mc="http://schemas.openxmlformats.org/markup-compatibility/2006">
-              <mc:Choice xmlns:v="urn:schemas-microsoft-com:vml" Requires="v">
-                <p:oleObj spid="_x0000_s308286" name="Equation" r:id="rId6" imgW="291960" imgH="939600" progId="Equation.DSMT4">
-                  <p:embed/>
-                </p:oleObj>
-              </mc:Choice>
-              <mc:Fallback>
-                <p:oleObj name="Equation" r:id="rId6" imgW="291960" imgH="939600" progId="Equation.DSMT4">
-                  <p:embed/>
-                  <p:pic>
-                    <p:nvPicPr>
-                      <p:cNvPr id="0" name="Picture 3"/>
-                      <p:cNvPicPr>
-                        <a:picLocks noChangeAspect="1" noChangeArrowheads="1"/>
-                      </p:cNvPicPr>
-                      <p:nvPr/>
-                    </p:nvPicPr>
-                    <p:blipFill>
-                      <a:blip r:embed="rId7">
-                        <a:extLst>
-                          <a:ext uri="{28A0092B-C50C-407E-A947-70E740481C1C}">
-                            <a14:useLocalDpi xmlns:a14="http://schemas.microsoft.com/office/drawing/2010/main" val="0"/>
-                          </a:ext>
-                        </a:extLst>
-                      </a:blip>
-                      <a:srcRect/>
-                      <a:stretch>
-                        <a:fillRect/>
-                      </a:stretch>
-                    </p:blipFill>
-                    <p:spPr bwMode="auto">
-                      <a:xfrm>
-                        <a:off x="1854433" y="4724400"/>
-                        <a:ext cx="292100" cy="990600"/>
-                      </a:xfrm>
-                      <a:prstGeom prst="rect">
-                        <a:avLst/>
-                      </a:prstGeom>
-                      <a:noFill/>
-                      <a:extLst>
-                        <a:ext uri="{909E8E84-426E-40dd-AFC4-6F175D3DCCD1}">
-                          <a14:hiddenFill xmlns:a14="http://schemas.microsoft.com/office/drawing/2010/main">
-                            <a:solidFill>
-                              <a:srgbClr val="FFFFFF"/>
-                            </a:solidFill>
-                          </a14:hiddenFill>
-                        </a:ext>
-                      </a:extLst>
-                    </p:spPr>
-                  </p:pic>
-                </p:oleObj>
-              </mc:Fallback>
-            </mc:AlternateContent>
-          </a:graphicData>
-        </a:graphic>
-      </p:graphicFrame>
-      <p:grpSp>
-        <p:nvGrpSpPr>
-          <p:cNvPr id="7" name="Group 20"/>
-          <p:cNvGrpSpPr/>
-          <p:nvPr/>
-        </p:nvGrpSpPr>
-        <p:grpSpPr>
-          <a:xfrm>
-            <a:off x="3378433" y="2895600"/>
-            <a:ext cx="824265" cy="2964597"/>
-            <a:chOff x="4876800" y="2895600"/>
-            <a:chExt cx="824265" cy="2964597"/>
-          </a:xfrm>
-        </p:grpSpPr>
-        <p:sp>
-          <p:nvSpPr>
-            <p:cNvPr id="19" name="TextBox 18"/>
-            <p:cNvSpPr txBox="1"/>
-            <p:nvPr/>
-          </p:nvSpPr>
-          <p:spPr>
-            <a:xfrm>
-              <a:off x="5029200" y="2895600"/>
-              <a:ext cx="524503" cy="830997"/>
-            </a:xfrm>
-            <a:prstGeom prst="rect">
-              <a:avLst/>
-            </a:prstGeom>
-            <a:noFill/>
-          </p:spPr>
-          <p:txBody>
-            <a:bodyPr wrap="none" rtlCol="0">
-              <a:spAutoFit/>
-            </a:bodyPr>
-            <a:lstStyle/>
-            <a:p>
-              <a:r>
-                <a:rPr lang="en-US" sz="4800" dirty="0" smtClean="0">
-                  <a:solidFill>
-                    <a:srgbClr val="FF0000"/>
-                  </a:solidFill>
-                  <a:latin typeface="Comic Sans MS" pitchFamily="66" charset="0"/>
-                </a:rPr>
-                <a:t>L</a:t>
-              </a:r>
-            </a:p>
-          </p:txBody>
-        </p:sp>
-        <p:sp>
-          <p:nvSpPr>
-            <p:cNvPr id="20" name="TextBox 19"/>
-            <p:cNvSpPr txBox="1"/>
-            <p:nvPr/>
-          </p:nvSpPr>
-          <p:spPr>
-            <a:xfrm>
-              <a:off x="4876800" y="5029200"/>
-              <a:ext cx="824265" cy="830997"/>
-            </a:xfrm>
-            <a:prstGeom prst="rect">
-              <a:avLst/>
-            </a:prstGeom>
-            <a:noFill/>
-          </p:spPr>
-          <p:txBody>
-            <a:bodyPr wrap="none" rtlCol="0">
-              <a:spAutoFit/>
-            </a:bodyPr>
-            <a:lstStyle/>
-            <a:p>
-              <a:r>
-                <a:rPr lang="en-US" sz="4800" dirty="0" smtClean="0">
-                  <a:solidFill>
-                    <a:srgbClr val="00B050"/>
-                  </a:solidFill>
-                  <a:latin typeface="Comic Sans MS" pitchFamily="66" charset="0"/>
-                </a:rPr>
-                <a:t>W</a:t>
-              </a:r>
-            </a:p>
-          </p:txBody>
-        </p:sp>
-      </p:grpSp>
-      <p:grpSp>
-        <p:nvGrpSpPr>
-          <p:cNvPr id="10" name="Group 25"/>
-          <p:cNvGrpSpPr/>
-          <p:nvPr/>
-        </p:nvGrpSpPr>
-        <p:grpSpPr>
-          <a:xfrm>
-            <a:off x="4343400" y="3200400"/>
-            <a:ext cx="4695516" cy="2362200"/>
-            <a:chOff x="4343400" y="3200400"/>
-            <a:chExt cx="4695516" cy="2362200"/>
-          </a:xfrm>
-        </p:grpSpPr>
-        <p:sp>
-          <p:nvSpPr>
-            <p:cNvPr id="23" name="TextBox 22"/>
-            <p:cNvSpPr txBox="1"/>
-            <p:nvPr/>
-          </p:nvSpPr>
-          <p:spPr>
-            <a:xfrm>
-              <a:off x="4343400" y="3200400"/>
-              <a:ext cx="4695516" cy="830997"/>
-            </a:xfrm>
-            <a:prstGeom prst="rect">
-              <a:avLst/>
-            </a:prstGeom>
-            <a:noFill/>
-          </p:spPr>
-          <p:txBody>
-            <a:bodyPr wrap="none" rtlCol="0">
-              <a:spAutoFit/>
-            </a:bodyPr>
-            <a:lstStyle/>
-            <a:p>
-              <a:r>
-                <a:rPr lang="en-US" sz="4800" dirty="0" smtClean="0">
-                  <a:solidFill>
-                    <a:srgbClr val="0000FF"/>
-                  </a:solidFill>
-                  <a:latin typeface="Comic Sans MS" pitchFamily="-128" charset="0"/>
-                </a:rPr>
-                <a:t>Pr{</a:t>
-              </a:r>
-              <a:r>
-                <a:rPr lang="en-US" sz="4800" dirty="0" smtClean="0">
-                  <a:solidFill>
-                    <a:srgbClr val="7030A0"/>
-                  </a:solidFill>
-                  <a:latin typeface="Comic Sans MS" pitchFamily="-128" charset="0"/>
-                </a:rPr>
-                <a:t>switch</a:t>
-              </a:r>
-              <a:r>
-                <a:rPr lang="en-US" sz="4800" dirty="0" smtClean="0">
-                  <a:solidFill>
-                    <a:schemeClr val="accent2"/>
-                  </a:solidFill>
-                  <a:latin typeface="Comic Sans MS" pitchFamily="-128" charset="0"/>
-                </a:rPr>
-                <a:t> </a:t>
-              </a:r>
-              <a:r>
-                <a:rPr lang="en-US" sz="4800" dirty="0" smtClean="0">
-                  <a:solidFill>
-                    <a:srgbClr val="008000"/>
-                  </a:solidFill>
-                  <a:latin typeface="Comic Sans MS" pitchFamily="-128" charset="0"/>
-                </a:rPr>
-                <a:t>wins</a:t>
-              </a:r>
-              <a:r>
-                <a:rPr lang="en-US" sz="4800" dirty="0" smtClean="0">
-                  <a:solidFill>
-                    <a:srgbClr val="0000FF"/>
-                  </a:solidFill>
-                  <a:latin typeface="Comic Sans MS" pitchFamily="-128" charset="0"/>
-                </a:rPr>
-                <a:t>}</a:t>
-              </a:r>
-              <a:r>
-                <a:rPr lang="en-US" sz="4800" dirty="0" smtClean="0">
-                  <a:solidFill>
-                    <a:srgbClr val="008000"/>
-                  </a:solidFill>
-                  <a:latin typeface="Comic Sans MS" pitchFamily="-128" charset="0"/>
-                </a:rPr>
-                <a:t> </a:t>
-              </a:r>
-              <a:endParaRPr lang="en-US" sz="4800" dirty="0">
-                <a:latin typeface="Comic Sans MS" pitchFamily="-128" charset="0"/>
-              </a:endParaRPr>
-            </a:p>
-          </p:txBody>
-        </p:sp>
-        <p:graphicFrame>
-          <p:nvGraphicFramePr>
-            <p:cNvPr id="25" name="Object 24"/>
-            <p:cNvGraphicFramePr>
-              <a:graphicFrameLocks noChangeAspect="1"/>
-            </p:cNvGraphicFramePr>
-            <p:nvPr/>
-          </p:nvGraphicFramePr>
-          <p:xfrm>
-            <a:off x="5486400" y="3784600"/>
-            <a:ext cx="1524000" cy="1778000"/>
-          </p:xfrm>
-          <a:graphic>
-            <a:graphicData uri="http://schemas.openxmlformats.org/presentationml/2006/ole">
-              <mc:AlternateContent xmlns:mc="http://schemas.openxmlformats.org/markup-compatibility/2006">
-                <mc:Choice xmlns:v="urn:schemas-microsoft-com:vml" Requires="v">
-                  <p:oleObj spid="_x0000_s308287" name="Equation" r:id="rId8" imgW="609480" imgH="939600" progId="Equation.DSMT4">
-                    <p:embed/>
-                  </p:oleObj>
-                </mc:Choice>
-                <mc:Fallback>
-                  <p:oleObj name="Equation" r:id="rId8" imgW="609480" imgH="939600" progId="Equation.DSMT4">
-                    <p:embed/>
-                    <p:pic>
-                      <p:nvPicPr>
-                        <p:cNvPr id="0" name="Picture 4"/>
-                        <p:cNvPicPr>
-                          <a:picLocks noChangeAspect="1" noChangeArrowheads="1"/>
-                        </p:cNvPicPr>
-                        <p:nvPr/>
-                      </p:nvPicPr>
-                      <p:blipFill>
-                        <a:blip r:embed="rId9">
-                          <a:extLst>
-                            <a:ext uri="{28A0092B-C50C-407E-A947-70E740481C1C}">
-                              <a14:useLocalDpi xmlns:a14="http://schemas.microsoft.com/office/drawing/2010/main" val="0"/>
-                            </a:ext>
-                          </a:extLst>
-                        </a:blip>
-                        <a:srcRect/>
-                        <a:stretch>
-                          <a:fillRect/>
-                        </a:stretch>
-                      </p:blipFill>
-                      <p:spPr bwMode="auto">
-                        <a:xfrm>
-                          <a:off x="5486400" y="3784600"/>
-                          <a:ext cx="1524000" cy="1778000"/>
-                        </a:xfrm>
-                        <a:prstGeom prst="rect">
-                          <a:avLst/>
-                        </a:prstGeom>
-                        <a:noFill/>
-                        <a:extLst>
-                          <a:ext uri="{909E8E84-426E-40dd-AFC4-6F175D3DCCD1}">
-                            <a14:hiddenFill xmlns:a14="http://schemas.microsoft.com/office/drawing/2010/main">
-                              <a:solidFill>
-                                <a:srgbClr val="FFFFFF"/>
-                              </a:solidFill>
-                            </a14:hiddenFill>
-                          </a:ext>
-                        </a:extLst>
-                      </p:spPr>
-                    </p:pic>
-                  </p:oleObj>
-                </mc:Fallback>
-              </mc:AlternateContent>
-            </a:graphicData>
-          </a:graphic>
-        </p:graphicFrame>
-      </p:grpSp>
-      <p:sp>
-        <p:nvSpPr>
-          <p:cNvPr id="22" name="Rectangle 11"/>
-          <p:cNvSpPr txBox="1">
-            <a:spLocks noChangeArrowheads="1"/>
-          </p:cNvSpPr>
-          <p:nvPr/>
-        </p:nvSpPr>
-        <p:spPr bwMode="auto">
-          <a:xfrm>
-            <a:off x="6400800" y="6613525"/>
-            <a:ext cx="2667000" cy="244475"/>
-          </a:xfrm>
-          <a:prstGeom prst="rect">
-            <a:avLst/>
-          </a:prstGeom>
-          <a:noFill/>
-          <a:ln w="9525">
-            <a:noFill/>
-            <a:miter lim="800000"/>
-            <a:headEnd/>
-            <a:tailEnd/>
-          </a:ln>
-          <a:effectLst/>
-        </p:spPr>
-        <p:txBody>
-          <a:bodyPr vert="horz" wrap="square" lIns="91440" tIns="45720" rIns="91440" bIns="45720" numCol="1" anchor="t" anchorCtr="0" compatLnSpc="1">
-            <a:prstTxWarp prst="textNoShape">
-              <a:avLst/>
-            </a:prstTxWarp>
-            <a:spAutoFit/>
-          </a:bodyPr>
-          <a:lstStyle>
-            <a:lvl1pPr algn="r">
-              <a:defRPr sz="1000"/>
-            </a:lvl1pPr>
-          </a:lstStyle>
-          <a:p>
-            <a:pPr marL="0" marR="0" lvl="0" indent="0" algn="r" defTabSz="914400" rtl="0" eaLnBrk="1" fontAlgn="base" latinLnBrk="0" hangingPunct="1">
-              <a:lnSpc>
-                <a:spcPct val="100000"/>
-              </a:lnSpc>
-              <a:spcBef>
-                <a:spcPct val="0"/>
-              </a:spcBef>
-              <a:spcAft>
-                <a:spcPct val="0"/>
-              </a:spcAft>
-              <a:buClrTx/>
-              <a:buSzTx/>
-              <a:buFontTx/>
-              <a:buNone/>
-              <a:tabLst/>
-              <a:defRPr/>
-            </a:pPr>
-            <a:r>
-              <a:rPr kumimoji="0" lang="en-US" sz="1000" b="0" i="0" u="none" strike="noStrike" kern="1200" cap="none" spc="0" normalizeH="0" baseline="0" noProof="0" dirty="0" err="1" smtClean="0">
-                <a:ln>
-                  <a:noFill/>
-                </a:ln>
-                <a:solidFill>
-                  <a:schemeClr val="tx1"/>
-                </a:solidFill>
-                <a:effectLst/>
-                <a:uLnTx/>
-                <a:uFillTx/>
-                <a:latin typeface="Comic Sans MS" pitchFamily="66" charset="0"/>
-                <a:ea typeface="+mn-ea"/>
-                <a:cs typeface="+mn-cs"/>
-              </a:rPr>
-              <a:t>lec</a:t>
-            </a:r>
-            <a:r>
-              <a:rPr kumimoji="0" lang="en-US" sz="1000" b="0" i="0" u="none" strike="noStrike" kern="1200" cap="none" spc="0" normalizeH="0" baseline="0" noProof="0" dirty="0" smtClean="0">
-                <a:ln>
-                  <a:noFill/>
-                </a:ln>
-                <a:solidFill>
-                  <a:schemeClr val="tx1"/>
-                </a:solidFill>
-                <a:effectLst/>
-                <a:uLnTx/>
-                <a:uFillTx/>
-                <a:latin typeface="Comic Sans MS" pitchFamily="66" charset="0"/>
-                <a:ea typeface="+mn-ea"/>
-                <a:cs typeface="+mn-cs"/>
-              </a:rPr>
-              <a:t> 13W.</a:t>
-            </a:r>
-            <a:fld id="{17233D2A-0857-4415-88C1-423492E69A26}" type="slidenum">
-              <a:rPr kumimoji="0" lang="en-US" sz="1000" b="0" i="0" u="none" strike="noStrike" kern="1200" cap="none" spc="0" normalizeH="0" baseline="0" noProof="0" smtClean="0">
-                <a:ln>
-                  <a:noFill/>
-                </a:ln>
-                <a:solidFill>
-                  <a:schemeClr val="tx1"/>
-                </a:solidFill>
-                <a:effectLst/>
-                <a:uLnTx/>
-                <a:uFillTx/>
-                <a:latin typeface="Comic Sans MS" pitchFamily="66" charset="0"/>
-                <a:ea typeface="+mn-ea"/>
-                <a:cs typeface="+mn-cs"/>
-              </a:rPr>
-              <a:pPr marL="0" marR="0" lvl="0" indent="0" algn="r" defTabSz="914400" rtl="0" eaLnBrk="1" fontAlgn="base" latinLnBrk="0" hangingPunct="1">
-                <a:lnSpc>
-                  <a:spcPct val="100000"/>
-                </a:lnSpc>
-                <a:spcBef>
-                  <a:spcPct val="0"/>
-                </a:spcBef>
-                <a:spcAft>
-                  <a:spcPct val="0"/>
-                </a:spcAft>
-                <a:buClrTx/>
-                <a:buSzTx/>
-                <a:buFontTx/>
-                <a:buNone/>
-                <a:tabLst/>
-                <a:defRPr/>
-              </a:pPr>
-              <a:t>20</a:t>
-            </a:fld>
-            <a:endParaRPr kumimoji="0" lang="en-US" sz="1000" b="0" i="0" u="none" strike="noStrike" kern="1200" cap="none" spc="0" normalizeH="0" baseline="0" noProof="0" dirty="0">
-              <a:ln>
-                <a:noFill/>
-              </a:ln>
-              <a:solidFill>
-                <a:schemeClr val="tx1"/>
-              </a:solidFill>
-              <a:effectLst/>
-              <a:uLnTx/>
-              <a:uFillTx/>
-              <a:latin typeface="Comic Sans MS" pitchFamily="66" charset="0"/>
-              <a:ea typeface="+mn-ea"/>
-              <a:cs typeface="+mn-cs"/>
-            </a:endParaRPr>
-          </a:p>
-        </p:txBody>
-      </p:sp>
-    </p:spTree>
-  </p:cSld>
-  <p:clrMapOvr>
-    <a:masterClrMapping/>
-  </p:clrMapOvr>
-  <p:transition xmlns:p14="http://schemas.microsoft.com/office/powerpoint/2010/main" spd="slow">
-    <p:fade thruBlk="1"/>
-  </p:transition>
-  <p:timing>
-    <p:tnLst>
-      <p:par>
-        <p:cTn xmlns:p14="http://schemas.microsoft.com/office/powerpoint/2010/main" id="1" dur="indefinite" restart="never" nodeType="tmRoot">
-          <p:childTnLst>
-            <p:seq concurrent="1" nextAc="seek">
-              <p:cTn id="2" dur="indefinite" nodeType="mainSeq">
-                <p:childTnLst>
-                  <p:par>
-                    <p:cTn id="3" fill="hold">
-                      <p:stCondLst>
-                        <p:cond delay="indefinite"/>
-                      </p:stCondLst>
-                      <p:childTnLst>
-                        <p:par>
-                          <p:cTn id="4" fill="hold">
-                            <p:stCondLst>
-                              <p:cond delay="0"/>
-                            </p:stCondLst>
-                            <p:childTnLst>
-                              <p:par>
-                                <p:cTn id="5" presetID="1" presetClass="entr" presetSubtype="0" fill="hold" nodeType="clickEffect">
-                                  <p:stCondLst>
-                                    <p:cond delay="0"/>
-                                  </p:stCondLst>
-                                  <p:childTnLst>
-                                    <p:set>
-                                      <p:cBhvr>
-                                        <p:cTn id="6" dur="1" fill="hold">
-                                          <p:stCondLst>
-                                            <p:cond delay="0"/>
-                                          </p:stCondLst>
-                                        </p:cTn>
-                                        <p:tgtEl>
-                                          <p:spTgt spid="2"/>
-                                        </p:tgtEl>
-                                        <p:attrNameLst>
-                                          <p:attrName>style.visibility</p:attrName>
-                                        </p:attrNameLst>
-                                      </p:cBhvr>
-                                      <p:to>
-                                        <p:strVal val="visible"/>
-                                      </p:to>
-                                    </p:set>
-                                  </p:childTnLst>
-                                </p:cTn>
-                              </p:par>
-                            </p:childTnLst>
-                          </p:cTn>
-                        </p:par>
-                      </p:childTnLst>
-                    </p:cTn>
-                  </p:par>
-                  <p:par>
-                    <p:cTn id="7" fill="hold">
-                      <p:stCondLst>
-                        <p:cond delay="indefinite"/>
-                      </p:stCondLst>
-                      <p:childTnLst>
-                        <p:par>
-                          <p:cTn id="8" fill="hold">
-                            <p:stCondLst>
-                              <p:cond delay="0"/>
-                            </p:stCondLst>
-                            <p:childTnLst>
-                              <p:par>
-                                <p:cTn id="9" presetID="9" presetClass="entr" presetSubtype="0" fill="hold" nodeType="clickEffect">
-                                  <p:stCondLst>
-                                    <p:cond delay="0"/>
-                                  </p:stCondLst>
-                                  <p:childTnLst>
-                                    <p:set>
-                                      <p:cBhvr>
-                                        <p:cTn id="10" dur="1" fill="hold">
-                                          <p:stCondLst>
-                                            <p:cond delay="0"/>
-                                          </p:stCondLst>
-                                        </p:cTn>
-                                        <p:tgtEl>
-                                          <p:spTgt spid="7"/>
-                                        </p:tgtEl>
-                                        <p:attrNameLst>
-                                          <p:attrName>style.visibility</p:attrName>
-                                        </p:attrNameLst>
-                                      </p:cBhvr>
-                                      <p:to>
-                                        <p:strVal val="visible"/>
-                                      </p:to>
-                                    </p:set>
-                                    <p:animEffect transition="in" filter="dissolve">
-                                      <p:cBhvr>
-                                        <p:cTn id="11" dur="500"/>
-                                        <p:tgtEl>
-                                          <p:spTgt spid="7"/>
-                                        </p:tgtEl>
-                                      </p:cBhvr>
-                                    </p:animEffect>
-                                  </p:childTnLst>
-                                </p:cTn>
-                              </p:par>
-                            </p:childTnLst>
-                          </p:cTn>
-                        </p:par>
-                      </p:childTnLst>
-                    </p:cTn>
-                  </p:par>
-                  <p:par>
-                    <p:cTn id="12" fill="hold">
-                      <p:stCondLst>
-                        <p:cond delay="indefinite"/>
-                      </p:stCondLst>
-                      <p:childTnLst>
-                        <p:par>
-                          <p:cTn id="13" fill="hold">
-                            <p:stCondLst>
-                              <p:cond delay="0"/>
-                            </p:stCondLst>
-                            <p:childTnLst>
-                              <p:par>
-                                <p:cTn id="14" presetID="1" presetClass="entr" presetSubtype="0" fill="hold" nodeType="clickEffect">
-                                  <p:stCondLst>
-                                    <p:cond delay="0"/>
-                                  </p:stCondLst>
-                                  <p:childTnLst>
-                                    <p:set>
-                                      <p:cBhvr>
-                                        <p:cTn id="15" dur="1" fill="hold">
-                                          <p:stCondLst>
-                                            <p:cond delay="0"/>
-                                          </p:stCondLst>
-                                        </p:cTn>
-                                        <p:tgtEl>
-                                          <p:spTgt spid="16"/>
-                                        </p:tgtEl>
-                                        <p:attrNameLst>
-                                          <p:attrName>style.visibility</p:attrName>
-                                        </p:attrNameLst>
-                                      </p:cBhvr>
-                                      <p:to>
-                                        <p:strVal val="visible"/>
-                                      </p:to>
-                                    </p:set>
-                                  </p:childTnLst>
-                                </p:cTn>
-                              </p:par>
-                            </p:childTnLst>
-                          </p:cTn>
-                        </p:par>
-                      </p:childTnLst>
-                    </p:cTn>
-                  </p:par>
-                  <p:par>
-                    <p:cTn id="16" fill="hold">
-                      <p:stCondLst>
-                        <p:cond delay="indefinite"/>
-                      </p:stCondLst>
-                      <p:childTnLst>
-                        <p:par>
-                          <p:cTn id="17" fill="hold">
-                            <p:stCondLst>
-                              <p:cond delay="0"/>
-                            </p:stCondLst>
-                            <p:childTnLst>
-                              <p:par>
-                                <p:cTn id="18" presetID="1" presetClass="entr" presetSubtype="0" fill="hold" nodeType="clickEffect">
-                                  <p:stCondLst>
-                                    <p:cond delay="0"/>
-                                  </p:stCondLst>
-                                  <p:childTnLst>
-                                    <p:set>
-                                      <p:cBhvr>
-                                        <p:cTn id="19" dur="1" fill="hold">
-                                          <p:stCondLst>
-                                            <p:cond delay="0"/>
-                                          </p:stCondLst>
-                                        </p:cTn>
-                                        <p:tgtEl>
-                                          <p:spTgt spid="35842"/>
-                                        </p:tgtEl>
-                                        <p:attrNameLst>
-                                          <p:attrName>style.visibility</p:attrName>
-                                        </p:attrNameLst>
-                                      </p:cBhvr>
-                                      <p:to>
-                                        <p:strVal val="visible"/>
-                                      </p:to>
-                                    </p:set>
-                                  </p:childTnLst>
-                                </p:cTn>
-                              </p:par>
-                            </p:childTnLst>
-                          </p:cTn>
-                        </p:par>
-                      </p:childTnLst>
-                    </p:cTn>
-                  </p:par>
-                  <p:par>
-                    <p:cTn id="20" fill="hold">
-                      <p:stCondLst>
-                        <p:cond delay="indefinite"/>
-                      </p:stCondLst>
-                      <p:childTnLst>
-                        <p:par>
-                          <p:cTn id="21" fill="hold">
-                            <p:stCondLst>
-                              <p:cond delay="0"/>
-                            </p:stCondLst>
-                            <p:childTnLst>
-                              <p:par>
-                                <p:cTn id="22" presetID="52" presetClass="entr" presetSubtype="0" fill="hold" nodeType="clickEffect">
-                                  <p:stCondLst>
-                                    <p:cond delay="0"/>
-                                  </p:stCondLst>
-                                  <p:childTnLst>
-                                    <p:set>
-                                      <p:cBhvr>
-                                        <p:cTn id="23" dur="1" fill="hold">
-                                          <p:stCondLst>
-                                            <p:cond delay="0"/>
-                                          </p:stCondLst>
-                                        </p:cTn>
-                                        <p:tgtEl>
-                                          <p:spTgt spid="10"/>
-                                        </p:tgtEl>
-                                        <p:attrNameLst>
-                                          <p:attrName>style.visibility</p:attrName>
-                                        </p:attrNameLst>
-                                      </p:cBhvr>
-                                      <p:to>
-                                        <p:strVal val="visible"/>
-                                      </p:to>
-                                    </p:set>
-                                    <p:animScale>
-                                      <p:cBhvr>
-                                        <p:cTn id="24" dur="1000" decel="50000" fill="hold">
-                                          <p:stCondLst>
-                                            <p:cond delay="0"/>
-                                          </p:stCondLst>
-                                        </p:cTn>
-                                        <p:tgtEl>
-                                          <p:spTgt spid="10"/>
-                                        </p:tgtEl>
-                                      </p:cBhvr>
-                                      <p:from x="250000" y="250000"/>
-                                      <p:to x="100000" y="100000"/>
-                                    </p:animScale>
-                                    <p:animMotion origin="layout" path="M -0.46736 0.92887  C -0.37517 0.88508  -0.02552 0.75279  0.0908 0.66613  C  0.20747 0.57948  0.21649 0.50394  0.23177 0.40825  C 0.24705 0.31256  0.22118 0.15964   0.18264 0.09152  C 0.1441 0.02341  0.03802 0.0  0.0 0.0  " pathEditMode="relative" ptsTypes="">
-                                      <p:cBhvr>
-                                        <p:cTn id="25" dur="1000" decel="50000" fill="hold">
-                                          <p:stCondLst>
-                                            <p:cond delay="0"/>
-                                          </p:stCondLst>
-                                        </p:cTn>
-                                        <p:tgtEl>
-                                          <p:spTgt spid="10"/>
-                                        </p:tgtEl>
-                                        <p:attrNameLst>
-                                          <p:attrName>ppt_x</p:attrName>
-                                          <p:attrName>ppt_y</p:attrName>
-                                        </p:attrNameLst>
-                                      </p:cBhvr>
-                                    </p:animMotion>
-                                    <p:animEffect transition="in" filter="fade">
-                                      <p:cBhvr>
-                                        <p:cTn id="26" dur="1000"/>
-                                        <p:tgtEl>
-                                          <p:spTgt spid="10"/>
-                                        </p:tgtEl>
-                                      </p:cBhvr>
-                                    </p:animEffect>
-                                  </p:childTnLst>
-                                </p:cTn>
-                              </p:par>
-                            </p:childTnLst>
-                          </p:cTn>
-                        </p:par>
-                      </p:childTnLst>
-                    </p:cTn>
-                  </p:par>
-                </p:childTnLst>
-              </p:cTn>
-              <p:prevCondLst>
-                <p:cond evt="onPrev" delay="0">
-                  <p:tgtEl>
-                    <p:sldTgt/>
-                  </p:tgtEl>
-                </p:cond>
-              </p:prevCondLst>
-              <p:nextCondLst>
-                <p:cond evt="onNext" delay="0">
-                  <p:tgtEl>
-                    <p:sldTgt/>
-                  </p:tgtEl>
-                </p:cond>
-              </p:nextCondLst>
-            </p:seq>
-          </p:childTnLst>
-        </p:cTn>
-      </p:par>
-    </p:tnLst>
-  </p:timing>
-</p:sld>
-</file>
-
 <file path=ppt/slides/slide3.xml><?xml version="1.0" encoding="utf-8"?>
 <p:sld xmlns:a="http://schemas.openxmlformats.org/drawingml/2006/main" xmlns:r="http://schemas.openxmlformats.org/officeDocument/2006/relationships" xmlns:p="http://schemas.openxmlformats.org/presentationml/2006/main">
   <p:cSld>
@@ -23304,7 +21723,7 @@
           <a:graphicData uri="http://schemas.openxmlformats.org/presentationml/2006/ole">
             <mc:AlternateContent xmlns:mc="http://schemas.openxmlformats.org/markup-compatibility/2006">
               <mc:Choice xmlns:v="urn:schemas-microsoft-com:vml" Requires="v">
-                <p:oleObj spid="_x0000_s34873" name="Equation" r:id="rId5" imgW="317500" imgH="533400" progId="Equation.DSMT4">
+                <p:oleObj spid="_x0000_s34887" name="Equation" r:id="rId5" imgW="317500" imgH="533400" progId="Equation.DSMT4">
                   <p:embed/>
                 </p:oleObj>
               </mc:Choice>
@@ -23374,7 +21793,7 @@
           <a:graphicData uri="http://schemas.openxmlformats.org/presentationml/2006/ole">
             <mc:AlternateContent xmlns:mc="http://schemas.openxmlformats.org/markup-compatibility/2006">
               <mc:Choice xmlns:v="urn:schemas-microsoft-com:vml" Requires="v">
-                <p:oleObj spid="_x0000_s34874" name="Equation" r:id="rId7" imgW="787400" imgH="533400" progId="Equation.DSMT4">
+                <p:oleObj spid="_x0000_s34888" name="Equation" r:id="rId7" imgW="787400" imgH="533400" progId="Equation.DSMT4">
                   <p:embed/>
                 </p:oleObj>
               </mc:Choice>
@@ -23436,7 +21855,7 @@
           <a:graphicData uri="http://schemas.openxmlformats.org/presentationml/2006/ole">
             <mc:AlternateContent xmlns:mc="http://schemas.openxmlformats.org/markup-compatibility/2006">
               <mc:Choice xmlns:v="urn:schemas-microsoft-com:vml" Requires="v">
-                <p:oleObj spid="_x0000_s34875" name="Equation" r:id="rId9" imgW="812800" imgH="1168400" progId="Equation.DSMT4">
+                <p:oleObj spid="_x0000_s34889" name="Equation" r:id="rId9" imgW="812800" imgH="1168400" progId="Equation.DSMT4">
                   <p:embed/>
                 </p:oleObj>
               </mc:Choice>
@@ -24019,7 +22438,7 @@
           <a:graphicData uri="http://schemas.openxmlformats.org/presentationml/2006/ole">
             <mc:AlternateContent xmlns:mc="http://schemas.openxmlformats.org/markup-compatibility/2006">
               <mc:Choice xmlns:v="urn:schemas-microsoft-com:vml" Requires="v">
-                <p:oleObj spid="_x0000_s245787" name="Equation" r:id="rId4" imgW="2412720" imgH="469800" progId="Equation.DSMT4">
+                <p:oleObj spid="_x0000_s245793" name="Equation" r:id="rId4" imgW="2412720" imgH="469800" progId="Equation.DSMT4">
                   <p:embed/>
                 </p:oleObj>
               </mc:Choice>

</xml_diff>